<commit_message>
Update Ethics in Modern Data.pptx
</commit_message>
<xml_diff>
--- a/SQLSat Baton Rouge BI 2020/Ethics in Modern Data.pptx
+++ b/SQLSat Baton Rouge BI 2020/Ethics in Modern Data.pptx
@@ -195,16 +195,32 @@
 </p:cmAuthorLst>
 </file>
 
-<file path=ppt/revisionInfo.xml><?xml version="1.0" encoding="utf-8"?>
-<p1510:revInfo xmlns:a="http://schemas.openxmlformats.org/drawingml/2006/main" xmlns:r="http://schemas.openxmlformats.org/officeDocument/2006/relationships" xmlns:p1510="http://schemas.microsoft.com/office/powerpoint/2015/10/main">
-  <p1510:revLst>
-    <p1510:client id="{3F651B5E-9455-4528-ACB5-78281FA73816}" v="16" dt="2019-10-18T01:17:35.374"/>
-  </p1510:revLst>
-</p1510:revInfo>
-</file>
-
 <file path=ppt/changesInfos/changesInfo1.xml><?xml version="1.0" encoding="utf-8"?>
 <pc:chgInfo xmlns:a="http://schemas.openxmlformats.org/drawingml/2006/main" xmlns:r="http://schemas.openxmlformats.org/officeDocument/2006/relationships" xmlns:ac="http://schemas.microsoft.com/office/drawing/2013/main/command" xmlns:pc="http://schemas.microsoft.com/office/powerpoint/2013/main/command">
+  <pc:docChgLst>
+    <pc:chgData name="william a" userId="c66c7249b60d4ab2" providerId="LiveId" clId="{066F1101-84BD-4F07-AB0D-8BECC44521E1}"/>
+    <pc:docChg chg="custSel modSld">
+      <pc:chgData name="william a" userId="c66c7249b60d4ab2" providerId="LiveId" clId="{066F1101-84BD-4F07-AB0D-8BECC44521E1}" dt="2019-12-19T15:27:23.138" v="14" actId="14100"/>
+      <pc:docMkLst>
+        <pc:docMk/>
+      </pc:docMkLst>
+      <pc:sldChg chg="modSp">
+        <pc:chgData name="william a" userId="c66c7249b60d4ab2" providerId="LiveId" clId="{066F1101-84BD-4F07-AB0D-8BECC44521E1}" dt="2019-12-19T15:27:23.138" v="14" actId="14100"/>
+        <pc:sldMkLst>
+          <pc:docMk/>
+          <pc:sldMk cId="2294722125" sldId="340"/>
+        </pc:sldMkLst>
+        <pc:spChg chg="mod">
+          <ac:chgData name="william a" userId="c66c7249b60d4ab2" providerId="LiveId" clId="{066F1101-84BD-4F07-AB0D-8BECC44521E1}" dt="2019-12-19T15:27:23.138" v="14" actId="14100"/>
+          <ac:spMkLst>
+            <pc:docMk/>
+            <pc:sldMk cId="2294722125" sldId="340"/>
+            <ac:spMk id="2" creationId="{EF24CA04-327F-4A45-8923-92F6874B5AD6}"/>
+          </ac:spMkLst>
+        </pc:spChg>
+      </pc:sldChg>
+    </pc:docChg>
+  </pc:docChgLst>
   <pc:docChgLst>
     <pc:chgData name="william a" userId="c66c7249b60d4ab2" providerId="LiveId" clId="{987DFEFB-91F3-4A2C-BC6D-A4C6CB8FF458}"/>
     <pc:docChg chg="undo custSel addSld delSld modSld sldOrd delMainMaster modMainMaster modSection">
@@ -2947,7 +2963,7 @@
           <a:p>
             <a:fld id="{2FDEA226-1950-9346-BBCC-45D214247BC3}" type="datetimeFigureOut">
               <a:rPr lang="en-US" smtClean="0"/>
-              <a:t>10/17/2019</a:t>
+              <a:t>12/19/2019</a:t>
             </a:fld>
             <a:endParaRPr lang="en-US"/>
           </a:p>
@@ -3047,7 +3063,7 @@
           <a:p>
             <a:fld id="{A76353FC-0869-45D3-95AF-CC29198471C2}" type="datetimeFigureOut">
               <a:rPr lang="en-US" smtClean="0"/>
-              <a:t>10/17/2019</a:t>
+              <a:t>12/19/2019</a:t>
             </a:fld>
             <a:endParaRPr lang="en-US"/>
           </a:p>
@@ -24711,8 +24727,8 @@
         </p:nvSpPr>
         <p:spPr>
           <a:xfrm>
-            <a:off x="322028" y="985737"/>
-            <a:ext cx="8480066" cy="2760946"/>
+            <a:off x="322027" y="985737"/>
+            <a:ext cx="8652923" cy="2760946"/>
           </a:xfrm>
         </p:spPr>
         <p:txBody>
@@ -24724,21 +24740,18 @@
                 <a:latin typeface="Roboto" panose="02000000000000000000" pitchFamily="2" charset="0"/>
                 <a:ea typeface="Roboto" panose="02000000000000000000" pitchFamily="2" charset="0"/>
               </a:rPr>
-              <a:t>Bias must be identified and </a:t>
-            </a:r>
-            <a:r>
-              <a:rPr lang="en-CA" sz="2800" dirty="0" err="1">
-                <a:latin typeface="Roboto" panose="02000000000000000000" pitchFamily="2" charset="0"/>
-                <a:ea typeface="Roboto" panose="02000000000000000000" pitchFamily="2" charset="0"/>
-              </a:rPr>
-              <a:t>acknolwedged</a:t>
+              <a:t>Bias exists. </a:t>
+            </a:r>
+            <a:r>
+              <a:rPr lang="en-CA" sz="2800" dirty="0"/>
+              <a:t>It </a:t>
             </a:r>
             <a:r>
               <a:rPr lang="en-CA" sz="2800" dirty="0">
                 <a:latin typeface="Roboto" panose="02000000000000000000" pitchFamily="2" charset="0"/>
                 <a:ea typeface="Roboto" panose="02000000000000000000" pitchFamily="2" charset="0"/>
               </a:rPr>
-              <a:t>.</a:t>
+              <a:t>must be identified and acknowledged.</a:t>
             </a:r>
           </a:p>
           <a:p>

</xml_diff>